<commit_message>
fixed typos, and minor figure alignment stuff
</commit_message>
<xml_diff>
--- a/figures/supp_analysis/confusion_matrices/supp_conf_matrices.pptx
+++ b/figures/supp_analysis/confusion_matrices/supp_conf_matrices.pptx
@@ -259,7 +259,7 @@
           <a:p>
             <a:fld id="{78117DF5-94FB-3447-BCB6-47B436F299F3}" type="datetimeFigureOut">
               <a:rPr lang="en-US" smtClean="0"/>
-              <a:t>5/26/20</a:t>
+              <a:t>9/8/20</a:t>
             </a:fld>
             <a:endParaRPr lang="en-US"/>
           </a:p>
@@ -457,7 +457,7 @@
           <a:p>
             <a:fld id="{78117DF5-94FB-3447-BCB6-47B436F299F3}" type="datetimeFigureOut">
               <a:rPr lang="en-US" smtClean="0"/>
-              <a:t>5/26/20</a:t>
+              <a:t>9/8/20</a:t>
             </a:fld>
             <a:endParaRPr lang="en-US"/>
           </a:p>
@@ -665,7 +665,7 @@
           <a:p>
             <a:fld id="{78117DF5-94FB-3447-BCB6-47B436F299F3}" type="datetimeFigureOut">
               <a:rPr lang="en-US" smtClean="0"/>
-              <a:t>5/26/20</a:t>
+              <a:t>9/8/20</a:t>
             </a:fld>
             <a:endParaRPr lang="en-US"/>
           </a:p>
@@ -863,7 +863,7 @@
           <a:p>
             <a:fld id="{78117DF5-94FB-3447-BCB6-47B436F299F3}" type="datetimeFigureOut">
               <a:rPr lang="en-US" smtClean="0"/>
-              <a:t>5/26/20</a:t>
+              <a:t>9/8/20</a:t>
             </a:fld>
             <a:endParaRPr lang="en-US"/>
           </a:p>
@@ -1138,7 +1138,7 @@
           <a:p>
             <a:fld id="{78117DF5-94FB-3447-BCB6-47B436F299F3}" type="datetimeFigureOut">
               <a:rPr lang="en-US" smtClean="0"/>
-              <a:t>5/26/20</a:t>
+              <a:t>9/8/20</a:t>
             </a:fld>
             <a:endParaRPr lang="en-US"/>
           </a:p>
@@ -1403,7 +1403,7 @@
           <a:p>
             <a:fld id="{78117DF5-94FB-3447-BCB6-47B436F299F3}" type="datetimeFigureOut">
               <a:rPr lang="en-US" smtClean="0"/>
-              <a:t>5/26/20</a:t>
+              <a:t>9/8/20</a:t>
             </a:fld>
             <a:endParaRPr lang="en-US"/>
           </a:p>
@@ -1815,7 +1815,7 @@
           <a:p>
             <a:fld id="{78117DF5-94FB-3447-BCB6-47B436F299F3}" type="datetimeFigureOut">
               <a:rPr lang="en-US" smtClean="0"/>
-              <a:t>5/26/20</a:t>
+              <a:t>9/8/20</a:t>
             </a:fld>
             <a:endParaRPr lang="en-US"/>
           </a:p>
@@ -1956,7 +1956,7 @@
           <a:p>
             <a:fld id="{78117DF5-94FB-3447-BCB6-47B436F299F3}" type="datetimeFigureOut">
               <a:rPr lang="en-US" smtClean="0"/>
-              <a:t>5/26/20</a:t>
+              <a:t>9/8/20</a:t>
             </a:fld>
             <a:endParaRPr lang="en-US"/>
           </a:p>
@@ -2069,7 +2069,7 @@
           <a:p>
             <a:fld id="{78117DF5-94FB-3447-BCB6-47B436F299F3}" type="datetimeFigureOut">
               <a:rPr lang="en-US" smtClean="0"/>
-              <a:t>5/26/20</a:t>
+              <a:t>9/8/20</a:t>
             </a:fld>
             <a:endParaRPr lang="en-US"/>
           </a:p>
@@ -2380,7 +2380,7 @@
           <a:p>
             <a:fld id="{78117DF5-94FB-3447-BCB6-47B436F299F3}" type="datetimeFigureOut">
               <a:rPr lang="en-US" smtClean="0"/>
-              <a:t>5/26/20</a:t>
+              <a:t>9/8/20</a:t>
             </a:fld>
             <a:endParaRPr lang="en-US"/>
           </a:p>
@@ -2668,7 +2668,7 @@
           <a:p>
             <a:fld id="{78117DF5-94FB-3447-BCB6-47B436F299F3}" type="datetimeFigureOut">
               <a:rPr lang="en-US" smtClean="0"/>
-              <a:t>5/26/20</a:t>
+              <a:t>9/8/20</a:t>
             </a:fld>
             <a:endParaRPr lang="en-US"/>
           </a:p>
@@ -2909,7 +2909,7 @@
           <a:p>
             <a:fld id="{78117DF5-94FB-3447-BCB6-47B436F299F3}" type="datetimeFigureOut">
               <a:rPr lang="en-US" smtClean="0"/>
-              <a:t>5/26/20</a:t>
+              <a:t>9/8/20</a:t>
             </a:fld>
             <a:endParaRPr lang="en-US"/>
           </a:p>
@@ -3328,10 +3328,10 @@
       </p:grpSpPr>
       <p:grpSp>
         <p:nvGrpSpPr>
-          <p:cNvPr id="2" name="Group 1">
-            <a:extLst>
-              <a:ext uri="{FF2B5EF4-FFF2-40B4-BE49-F238E27FC236}">
-                <a16:creationId xmlns:a16="http://schemas.microsoft.com/office/drawing/2014/main" id="{174E500A-2250-FB4C-A488-4EE5D870F73A}"/>
+          <p:cNvPr id="4" name="Group 3">
+            <a:extLst>
+              <a:ext uri="{FF2B5EF4-FFF2-40B4-BE49-F238E27FC236}">
+                <a16:creationId xmlns:a16="http://schemas.microsoft.com/office/drawing/2014/main" id="{76800D07-BE07-4B4E-A2E3-C33444CF4FCF}"/>
               </a:ext>
             </a:extLst>
           </p:cNvPr>
@@ -3340,9 +3340,9 @@
         </p:nvGrpSpPr>
         <p:grpSpPr>
           <a:xfrm>
-            <a:off x="0" y="-685495"/>
+            <a:off x="0" y="-75895"/>
             <a:ext cx="12845568" cy="8172427"/>
-            <a:chOff x="0" y="-685495"/>
+            <a:chOff x="0" y="-75895"/>
             <a:chExt cx="12845568" cy="8172427"/>
           </a:xfrm>
         </p:grpSpPr>
@@ -3360,7 +3360,7 @@
           </p:nvGrpSpPr>
           <p:grpSpPr>
             <a:xfrm>
-              <a:off x="0" y="-685495"/>
+              <a:off x="0" y="-75895"/>
               <a:ext cx="12845568" cy="8172427"/>
               <a:chOff x="0" y="-685495"/>
               <a:chExt cx="12845568" cy="8172427"/>
@@ -3669,6 +3669,342 @@
         </p:grpSp>
         <p:sp>
           <p:nvSpPr>
+            <p:cNvPr id="3" name="Rectangle 2">
+              <a:extLst>
+                <a:ext uri="{FF2B5EF4-FFF2-40B4-BE49-F238E27FC236}">
+                  <a16:creationId xmlns:a16="http://schemas.microsoft.com/office/drawing/2014/main" id="{CA97AD1A-23F7-484A-896B-CFFC653DF77A}"/>
+                </a:ext>
+              </a:extLst>
+            </p:cNvPr>
+            <p:cNvSpPr/>
+            <p:nvPr/>
+          </p:nvSpPr>
+          <p:spPr>
+            <a:xfrm>
+              <a:off x="2158232" y="4419578"/>
+              <a:ext cx="720903" cy="279852"/>
+            </a:xfrm>
+            <a:prstGeom prst="rect">
+              <a:avLst/>
+            </a:prstGeom>
+            <a:solidFill>
+              <a:schemeClr val="bg1"/>
+            </a:solidFill>
+            <a:ln>
+              <a:noFill/>
+            </a:ln>
+          </p:spPr>
+          <p:style>
+            <a:lnRef idx="2">
+              <a:schemeClr val="accent1">
+                <a:shade val="50000"/>
+              </a:schemeClr>
+            </a:lnRef>
+            <a:fillRef idx="1">
+              <a:schemeClr val="accent1"/>
+            </a:fillRef>
+            <a:effectRef idx="0">
+              <a:schemeClr val="accent1"/>
+            </a:effectRef>
+            <a:fontRef idx="minor">
+              <a:schemeClr val="lt1"/>
+            </a:fontRef>
+          </p:style>
+          <p:txBody>
+            <a:bodyPr rtlCol="0" anchor="ctr"/>
+            <a:lstStyle/>
+            <a:p>
+              <a:pPr algn="ctr"/>
+              <a:endParaRPr lang="en-US">
+                <a:solidFill>
+                  <a:schemeClr val="bg1"/>
+                </a:solidFill>
+              </a:endParaRPr>
+            </a:p>
+          </p:txBody>
+        </p:sp>
+        <p:sp>
+          <p:nvSpPr>
+            <p:cNvPr id="22" name="Rectangle 21">
+              <a:extLst>
+                <a:ext uri="{FF2B5EF4-FFF2-40B4-BE49-F238E27FC236}">
+                  <a16:creationId xmlns:a16="http://schemas.microsoft.com/office/drawing/2014/main" id="{A7ED5A0C-4EE5-2148-94E3-418D0D4F5A79}"/>
+                </a:ext>
+              </a:extLst>
+            </p:cNvPr>
+            <p:cNvSpPr/>
+            <p:nvPr/>
+          </p:nvSpPr>
+          <p:spPr>
+            <a:xfrm>
+              <a:off x="6224753" y="4416132"/>
+              <a:ext cx="720903" cy="279852"/>
+            </a:xfrm>
+            <a:prstGeom prst="rect">
+              <a:avLst/>
+            </a:prstGeom>
+            <a:solidFill>
+              <a:schemeClr val="bg1"/>
+            </a:solidFill>
+            <a:ln>
+              <a:noFill/>
+            </a:ln>
+          </p:spPr>
+          <p:style>
+            <a:lnRef idx="2">
+              <a:schemeClr val="accent1">
+                <a:shade val="50000"/>
+              </a:schemeClr>
+            </a:lnRef>
+            <a:fillRef idx="1">
+              <a:schemeClr val="accent1"/>
+            </a:fillRef>
+            <a:effectRef idx="0">
+              <a:schemeClr val="accent1"/>
+            </a:effectRef>
+            <a:fontRef idx="minor">
+              <a:schemeClr val="lt1"/>
+            </a:fontRef>
+          </p:style>
+          <p:txBody>
+            <a:bodyPr rtlCol="0" anchor="ctr"/>
+            <a:lstStyle/>
+            <a:p>
+              <a:pPr algn="ctr"/>
+              <a:endParaRPr lang="en-US">
+                <a:solidFill>
+                  <a:schemeClr val="bg1"/>
+                </a:solidFill>
+              </a:endParaRPr>
+            </a:p>
+          </p:txBody>
+        </p:sp>
+        <p:sp>
+          <p:nvSpPr>
+            <p:cNvPr id="24" name="Rectangle 23">
+              <a:extLst>
+                <a:ext uri="{FF2B5EF4-FFF2-40B4-BE49-F238E27FC236}">
+                  <a16:creationId xmlns:a16="http://schemas.microsoft.com/office/drawing/2014/main" id="{00053F51-5162-3346-A2E1-B419B05C89B9}"/>
+                </a:ext>
+              </a:extLst>
+            </p:cNvPr>
+            <p:cNvSpPr/>
+            <p:nvPr/>
+          </p:nvSpPr>
+          <p:spPr>
+            <a:xfrm>
+              <a:off x="9978997" y="4418208"/>
+              <a:ext cx="720903" cy="279852"/>
+            </a:xfrm>
+            <a:prstGeom prst="rect">
+              <a:avLst/>
+            </a:prstGeom>
+            <a:solidFill>
+              <a:schemeClr val="bg1"/>
+            </a:solidFill>
+            <a:ln>
+              <a:noFill/>
+            </a:ln>
+          </p:spPr>
+          <p:style>
+            <a:lnRef idx="2">
+              <a:schemeClr val="accent1">
+                <a:shade val="50000"/>
+              </a:schemeClr>
+            </a:lnRef>
+            <a:fillRef idx="1">
+              <a:schemeClr val="accent1"/>
+            </a:fillRef>
+            <a:effectRef idx="0">
+              <a:schemeClr val="accent1"/>
+            </a:effectRef>
+            <a:fontRef idx="minor">
+              <a:schemeClr val="lt1"/>
+            </a:fontRef>
+          </p:style>
+          <p:txBody>
+            <a:bodyPr rtlCol="0" anchor="ctr"/>
+            <a:lstStyle/>
+            <a:p>
+              <a:pPr algn="ctr"/>
+              <a:endParaRPr lang="en-US">
+                <a:solidFill>
+                  <a:schemeClr val="bg1"/>
+                </a:solidFill>
+              </a:endParaRPr>
+            </a:p>
+          </p:txBody>
+        </p:sp>
+        <p:sp>
+          <p:nvSpPr>
+            <p:cNvPr id="26" name="Rectangle 25">
+              <a:extLst>
+                <a:ext uri="{FF2B5EF4-FFF2-40B4-BE49-F238E27FC236}">
+                  <a16:creationId xmlns:a16="http://schemas.microsoft.com/office/drawing/2014/main" id="{AA7856A8-D2EB-514F-94C2-BF7A8157A6EE}"/>
+                </a:ext>
+              </a:extLst>
+            </p:cNvPr>
+            <p:cNvSpPr/>
+            <p:nvPr/>
+          </p:nvSpPr>
+          <p:spPr>
+            <a:xfrm>
+              <a:off x="2152540" y="140322"/>
+              <a:ext cx="720903" cy="279852"/>
+            </a:xfrm>
+            <a:prstGeom prst="rect">
+              <a:avLst/>
+            </a:prstGeom>
+            <a:solidFill>
+              <a:schemeClr val="bg1"/>
+            </a:solidFill>
+            <a:ln>
+              <a:noFill/>
+            </a:ln>
+          </p:spPr>
+          <p:style>
+            <a:lnRef idx="2">
+              <a:schemeClr val="accent1">
+                <a:shade val="50000"/>
+              </a:schemeClr>
+            </a:lnRef>
+            <a:fillRef idx="1">
+              <a:schemeClr val="accent1"/>
+            </a:fillRef>
+            <a:effectRef idx="0">
+              <a:schemeClr val="accent1"/>
+            </a:effectRef>
+            <a:fontRef idx="minor">
+              <a:schemeClr val="lt1"/>
+            </a:fontRef>
+          </p:style>
+          <p:txBody>
+            <a:bodyPr rtlCol="0" anchor="ctr"/>
+            <a:lstStyle/>
+            <a:p>
+              <a:pPr algn="ctr"/>
+              <a:endParaRPr lang="en-US">
+                <a:solidFill>
+                  <a:schemeClr val="bg1"/>
+                </a:solidFill>
+              </a:endParaRPr>
+            </a:p>
+          </p:txBody>
+        </p:sp>
+        <p:sp>
+          <p:nvSpPr>
+            <p:cNvPr id="28" name="Rectangle 27">
+              <a:extLst>
+                <a:ext uri="{FF2B5EF4-FFF2-40B4-BE49-F238E27FC236}">
+                  <a16:creationId xmlns:a16="http://schemas.microsoft.com/office/drawing/2014/main" id="{2EAE7A13-8AF0-F647-876E-47FBF7B257E9}"/>
+                </a:ext>
+              </a:extLst>
+            </p:cNvPr>
+            <p:cNvSpPr/>
+            <p:nvPr/>
+          </p:nvSpPr>
+          <p:spPr>
+            <a:xfrm>
+              <a:off x="6224753" y="132561"/>
+              <a:ext cx="720903" cy="279852"/>
+            </a:xfrm>
+            <a:prstGeom prst="rect">
+              <a:avLst/>
+            </a:prstGeom>
+            <a:solidFill>
+              <a:schemeClr val="bg1"/>
+            </a:solidFill>
+            <a:ln>
+              <a:noFill/>
+            </a:ln>
+          </p:spPr>
+          <p:style>
+            <a:lnRef idx="2">
+              <a:schemeClr val="accent1">
+                <a:shade val="50000"/>
+              </a:schemeClr>
+            </a:lnRef>
+            <a:fillRef idx="1">
+              <a:schemeClr val="accent1"/>
+            </a:fillRef>
+            <a:effectRef idx="0">
+              <a:schemeClr val="accent1"/>
+            </a:effectRef>
+            <a:fontRef idx="minor">
+              <a:schemeClr val="lt1"/>
+            </a:fontRef>
+          </p:style>
+          <p:txBody>
+            <a:bodyPr rtlCol="0" anchor="ctr"/>
+            <a:lstStyle/>
+            <a:p>
+              <a:pPr algn="ctr"/>
+              <a:endParaRPr lang="en-US">
+                <a:solidFill>
+                  <a:schemeClr val="bg1"/>
+                </a:solidFill>
+              </a:endParaRPr>
+            </a:p>
+          </p:txBody>
+        </p:sp>
+        <p:sp>
+          <p:nvSpPr>
+            <p:cNvPr id="30" name="Rectangle 29">
+              <a:extLst>
+                <a:ext uri="{FF2B5EF4-FFF2-40B4-BE49-F238E27FC236}">
+                  <a16:creationId xmlns:a16="http://schemas.microsoft.com/office/drawing/2014/main" id="{31F49567-91B0-9948-86CA-7FFD5433605F}"/>
+                </a:ext>
+              </a:extLst>
+            </p:cNvPr>
+            <p:cNvSpPr/>
+            <p:nvPr/>
+          </p:nvSpPr>
+          <p:spPr>
+            <a:xfrm>
+              <a:off x="9854519" y="126983"/>
+              <a:ext cx="720903" cy="279852"/>
+            </a:xfrm>
+            <a:prstGeom prst="rect">
+              <a:avLst/>
+            </a:prstGeom>
+            <a:solidFill>
+              <a:schemeClr val="bg1"/>
+            </a:solidFill>
+            <a:ln>
+              <a:noFill/>
+            </a:ln>
+          </p:spPr>
+          <p:style>
+            <a:lnRef idx="2">
+              <a:schemeClr val="accent1">
+                <a:shade val="50000"/>
+              </a:schemeClr>
+            </a:lnRef>
+            <a:fillRef idx="1">
+              <a:schemeClr val="accent1"/>
+            </a:fillRef>
+            <a:effectRef idx="0">
+              <a:schemeClr val="accent1"/>
+            </a:effectRef>
+            <a:fontRef idx="minor">
+              <a:schemeClr val="lt1"/>
+            </a:fontRef>
+          </p:style>
+          <p:txBody>
+            <a:bodyPr rtlCol="0" anchor="ctr"/>
+            <a:lstStyle/>
+            <a:p>
+              <a:pPr algn="ctr"/>
+              <a:endParaRPr lang="en-US">
+                <a:solidFill>
+                  <a:schemeClr val="bg1"/>
+                </a:solidFill>
+              </a:endParaRPr>
+            </a:p>
+          </p:txBody>
+        </p:sp>
+        <p:sp>
+          <p:nvSpPr>
             <p:cNvPr id="12" name="TextBox 11">
               <a:extLst>
                 <a:ext uri="{FF2B5EF4-FFF2-40B4-BE49-F238E27FC236}">
@@ -3681,7 +4017,7 @@
           </p:nvSpPr>
           <p:spPr>
             <a:xfrm>
-              <a:off x="9970475" y="-488163"/>
+              <a:off x="9919898" y="110498"/>
               <a:ext cx="612129" cy="276999"/>
             </a:xfrm>
             <a:prstGeom prst="rect">
@@ -3724,7 +4060,7 @@
           </p:nvSpPr>
           <p:spPr>
             <a:xfrm>
-              <a:off x="6194775" y="-477975"/>
+              <a:off x="6144198" y="120686"/>
               <a:ext cx="612129" cy="276999"/>
             </a:xfrm>
             <a:prstGeom prst="rect">
@@ -3767,7 +4103,7 @@
           </p:nvSpPr>
           <p:spPr>
             <a:xfrm>
-              <a:off x="2213405" y="-477975"/>
+              <a:off x="2162828" y="120686"/>
               <a:ext cx="612129" cy="276999"/>
             </a:xfrm>
             <a:prstGeom prst="rect">
@@ -3810,7 +4146,7 @@
           </p:nvSpPr>
           <p:spPr>
             <a:xfrm>
-              <a:off x="2213404" y="3811552"/>
+              <a:off x="2162827" y="4410213"/>
               <a:ext cx="612129" cy="276999"/>
             </a:xfrm>
             <a:prstGeom prst="rect">
@@ -3853,7 +4189,7 @@
           </p:nvSpPr>
           <p:spPr>
             <a:xfrm>
-              <a:off x="6203884" y="3810643"/>
+              <a:off x="6153307" y="4409304"/>
               <a:ext cx="612129" cy="276999"/>
             </a:xfrm>
             <a:prstGeom prst="rect">
@@ -3896,7 +4232,7 @@
           </p:nvSpPr>
           <p:spPr>
             <a:xfrm>
-              <a:off x="10020035" y="3810642"/>
+              <a:off x="9969458" y="4409303"/>
               <a:ext cx="612129" cy="276999"/>
             </a:xfrm>
             <a:prstGeom prst="rect">

</xml_diff>